<commit_message>
update what you will need
</commit_message>
<xml_diff>
--- a/LetsHackYourToy.pptx
+++ b/LetsHackYourToy.pptx
@@ -2571,13 +2571,16 @@
         <a:lstStyle/>
         <a:p>
           <a:pPr>
+            <a:lnSpc>
+              <a:spcPct val="100000"/>
+            </a:lnSpc>
             <a:defRPr cap="all"/>
           </a:pPr>
           <a:r>
-            <a:rPr lang="fr-FR"/>
+            <a:rPr lang="fr-FR" dirty="0"/>
             <a:t>Chrome web-browser</a:t>
           </a:r>
-          <a:endParaRPr lang="en-US"/>
+          <a:endParaRPr lang="en-US" dirty="0"/>
         </a:p>
       </dgm:t>
     </dgm:pt>
@@ -2611,6 +2614,9 @@
         <a:lstStyle/>
         <a:p>
           <a:pPr>
+            <a:lnSpc>
+              <a:spcPct val="100000"/>
+            </a:lnSpc>
             <a:defRPr cap="all"/>
           </a:pPr>
           <a:r>
@@ -2623,7 +2629,19 @@
           </a:r>
           <a:r>
             <a:rPr lang="fr-FR" dirty="0"/>
-            <a:t> editor (Visual Studio Code, Sublime </a:t>
+            <a:t> editor </a:t>
+          </a:r>
+        </a:p>
+        <a:p>
+          <a:pPr>
+            <a:lnSpc>
+              <a:spcPct val="100000"/>
+            </a:lnSpc>
+            <a:defRPr cap="all"/>
+          </a:pPr>
+          <a:r>
+            <a:rPr lang="fr-FR" dirty="0"/>
+            <a:t>(VS Code, Sublime </a:t>
           </a:r>
           <a:r>
             <a:rPr lang="fr-FR" dirty="0" err="1"/>
@@ -2659,6 +2677,66 @@
         </a:p>
       </dgm:t>
     </dgm:pt>
+    <dgm:pt modelId="{A7BAE8F6-EBE0-4B31-A9EA-92EFAB498879}">
+      <dgm:prSet/>
+      <dgm:spPr/>
+      <dgm:t>
+        <a:bodyPr/>
+        <a:lstStyle/>
+        <a:p>
+          <a:pPr>
+            <a:lnSpc>
+              <a:spcPct val="100000"/>
+            </a:lnSpc>
+            <a:defRPr cap="all"/>
+          </a:pPr>
+          <a:r>
+            <a:rPr lang="en-US" dirty="0"/>
+            <a:t>A Bluetooth connector</a:t>
+          </a:r>
+          <a:endParaRPr lang="en-US" dirty="0">
+            <a:hlinkClick xmlns:r="http://schemas.openxmlformats.org/officeDocument/2006/relationships" r:id="rId1"/>
+          </a:endParaRPr>
+        </a:p>
+        <a:p>
+          <a:pPr>
+            <a:lnSpc>
+              <a:spcPct val="100000"/>
+            </a:lnSpc>
+            <a:defRPr cap="all"/>
+          </a:pPr>
+          <a:r>
+            <a:rPr lang="en-US" dirty="0">
+              <a:hlinkClick xmlns:r="http://schemas.openxmlformats.org/officeDocument/2006/relationships" r:id="rId1"/>
+            </a:rPr>
+            <a:t>https://www.amazon.com/Plugable-Bluetooth-Adapter-Raspberry-Compatible/dp/B009ZIILLI</a:t>
+          </a:r>
+          <a:endParaRPr lang="en-US" dirty="0"/>
+        </a:p>
+      </dgm:t>
+    </dgm:pt>
+    <dgm:pt modelId="{13DF959B-7204-494D-98FB-A3BB5E926417}" type="parTrans" cxnId="{DEC924F2-5DFC-4BB0-81C4-72F0734476B2}">
+      <dgm:prSet/>
+      <dgm:spPr/>
+      <dgm:t>
+        <a:bodyPr/>
+        <a:lstStyle/>
+        <a:p>
+          <a:endParaRPr lang="en-US"/>
+        </a:p>
+      </dgm:t>
+    </dgm:pt>
+    <dgm:pt modelId="{2E06DD33-D603-46C4-8AD0-33492B3FFEF2}" type="sibTrans" cxnId="{DEC924F2-5DFC-4BB0-81C4-72F0734476B2}">
+      <dgm:prSet/>
+      <dgm:spPr/>
+      <dgm:t>
+        <a:bodyPr/>
+        <a:lstStyle/>
+        <a:p>
+          <a:endParaRPr lang="en-US"/>
+        </a:p>
+      </dgm:t>
+    </dgm:pt>
     <dgm:pt modelId="{119DC426-ACF9-4541-AFFF-53F8056FEEA6}" type="pres">
       <dgm:prSet presAssocID="{E2FE9E51-AC0F-4703-8A03-EA856293271A}" presName="root" presStyleCnt="0">
         <dgm:presLayoutVars>
@@ -2673,7 +2751,7 @@
       <dgm:spPr/>
     </dgm:pt>
     <dgm:pt modelId="{CD11A416-E697-4B70-9753-88472124D763}" type="pres">
-      <dgm:prSet presAssocID="{ECA1677E-FCCB-40AF-93D0-51A0607F8C01}" presName="iconBgRect" presStyleLbl="bgShp" presStyleIdx="0" presStyleCnt="2"/>
+      <dgm:prSet presAssocID="{ECA1677E-FCCB-40AF-93D0-51A0607F8C01}" presName="iconBgRect" presStyleLbl="bgShp" presStyleIdx="0" presStyleCnt="3" custLinFactNeighborX="13452" custLinFactNeighborY="-2704"/>
       <dgm:spPr>
         <a:prstGeom prst="round2DiagRect">
           <a:avLst>
@@ -2684,16 +2762,16 @@
       </dgm:spPr>
     </dgm:pt>
     <dgm:pt modelId="{ED68D38F-83F1-4B3C-BE0B-5837012B99B3}" type="pres">
-      <dgm:prSet presAssocID="{ECA1677E-FCCB-40AF-93D0-51A0607F8C01}" presName="iconRect" presStyleLbl="node1" presStyleIdx="0" presStyleCnt="2"/>
+      <dgm:prSet presAssocID="{ECA1677E-FCCB-40AF-93D0-51A0607F8C01}" presName="iconRect" presStyleLbl="node1" presStyleIdx="0" presStyleCnt="3" custLinFactNeighborX="23445" custLinFactNeighborY="-4713"/>
       <dgm:spPr>
         <a:blipFill>
-          <a:blip xmlns:r="http://schemas.openxmlformats.org/officeDocument/2006/relationships" r:embed="rId1">
+          <a:blip xmlns:r="http://schemas.openxmlformats.org/officeDocument/2006/relationships" r:embed="rId2">
             <a:extLst>
               <a:ext uri="{28A0092B-C50C-407E-A947-70E740481C1C}">
                 <a14:useLocalDpi xmlns:a14="http://schemas.microsoft.com/office/drawing/2010/main" val="0"/>
               </a:ext>
               <a:ext uri="{96DAC541-7B7A-43D3-8B79-37D633B846F1}">
-                <asvg:svgBlip xmlns:asvg="http://schemas.microsoft.com/office/drawing/2016/SVG/main" r:embed="rId2"/>
+                <asvg:svgBlip xmlns:asvg="http://schemas.microsoft.com/office/drawing/2016/SVG/main" r:embed="rId3"/>
               </a:ext>
             </a:extLst>
           </a:blip>
@@ -2716,7 +2794,7 @@
       <dgm:spPr/>
     </dgm:pt>
     <dgm:pt modelId="{B97C7C68-060C-4A7E-8D2B-4650468BFE2C}" type="pres">
-      <dgm:prSet presAssocID="{ECA1677E-FCCB-40AF-93D0-51A0607F8C01}" presName="textRect" presStyleLbl="revTx" presStyleIdx="0" presStyleCnt="2">
+      <dgm:prSet presAssocID="{ECA1677E-FCCB-40AF-93D0-51A0607F8C01}" presName="textRect" presStyleLbl="revTx" presStyleIdx="0" presStyleCnt="3" custScaleX="101380" custLinFactNeighborX="8206" custLinFactNeighborY="-34565">
         <dgm:presLayoutVars>
           <dgm:chMax val="1"/>
           <dgm:chPref val="1"/>
@@ -2733,7 +2811,7 @@
       <dgm:spPr/>
     </dgm:pt>
     <dgm:pt modelId="{E483868C-BBE0-4B9A-A0E3-046B1A96E799}" type="pres">
-      <dgm:prSet presAssocID="{B7CA5452-D040-4A4E-AC57-621C93A53CA4}" presName="iconBgRect" presStyleLbl="bgShp" presStyleIdx="1" presStyleCnt="2"/>
+      <dgm:prSet presAssocID="{B7CA5452-D040-4A4E-AC57-621C93A53CA4}" presName="iconBgRect" presStyleLbl="bgShp" presStyleIdx="1" presStyleCnt="3" custLinFactNeighborX="-5628" custLinFactNeighborY="-1172"/>
       <dgm:spPr>
         <a:prstGeom prst="round2DiagRect">
           <a:avLst>
@@ -2744,16 +2822,16 @@
       </dgm:spPr>
     </dgm:pt>
     <dgm:pt modelId="{1BB9DB62-BEA7-4130-965F-EFED00E22180}" type="pres">
-      <dgm:prSet presAssocID="{B7CA5452-D040-4A4E-AC57-621C93A53CA4}" presName="iconRect" presStyleLbl="node1" presStyleIdx="1" presStyleCnt="2"/>
+      <dgm:prSet presAssocID="{B7CA5452-D040-4A4E-AC57-621C93A53CA4}" presName="iconRect" presStyleLbl="node1" presStyleIdx="1" presStyleCnt="3" custLinFactNeighborX="-9811" custLinFactNeighborY="-2042"/>
       <dgm:spPr>
         <a:blipFill>
-          <a:blip xmlns:r="http://schemas.openxmlformats.org/officeDocument/2006/relationships" r:embed="rId3">
+          <a:blip xmlns:r="http://schemas.openxmlformats.org/officeDocument/2006/relationships" r:embed="rId4">
             <a:extLst>
               <a:ext uri="{28A0092B-C50C-407E-A947-70E740481C1C}">
                 <a14:useLocalDpi xmlns:a14="http://schemas.microsoft.com/office/drawing/2010/main" val="0"/>
               </a:ext>
               <a:ext uri="{96DAC541-7B7A-43D3-8B79-37D633B846F1}">
-                <asvg:svgBlip xmlns:asvg="http://schemas.microsoft.com/office/drawing/2016/SVG/main" r:embed="rId4"/>
+                <asvg:svgBlip xmlns:asvg="http://schemas.microsoft.com/office/drawing/2016/SVG/main" r:embed="rId5"/>
               </a:ext>
             </a:extLst>
           </a:blip>
@@ -2776,7 +2854,62 @@
       <dgm:spPr/>
     </dgm:pt>
     <dgm:pt modelId="{C36941ED-5DA8-4069-BC84-144D8FCF12C8}" type="pres">
-      <dgm:prSet presAssocID="{B7CA5452-D040-4A4E-AC57-621C93A53CA4}" presName="textRect" presStyleLbl="revTx" presStyleIdx="1" presStyleCnt="2">
+      <dgm:prSet presAssocID="{B7CA5452-D040-4A4E-AC57-621C93A53CA4}" presName="textRect" presStyleLbl="revTx" presStyleIdx="1" presStyleCnt="3" custLinFactNeighborX="-2302" custLinFactNeighborY="-50777">
+        <dgm:presLayoutVars>
+          <dgm:chMax val="1"/>
+          <dgm:chPref val="1"/>
+        </dgm:presLayoutVars>
+      </dgm:prSet>
+      <dgm:spPr/>
+    </dgm:pt>
+    <dgm:pt modelId="{9C6EE070-B44D-4E71-BB5A-CA966FFDA2E8}" type="pres">
+      <dgm:prSet presAssocID="{81B151DD-4168-43F6-A364-EBDF76F99057}" presName="sibTrans" presStyleCnt="0"/>
+      <dgm:spPr/>
+    </dgm:pt>
+    <dgm:pt modelId="{D581F1A7-9ADC-4464-909F-2B980C10E7D1}" type="pres">
+      <dgm:prSet presAssocID="{A7BAE8F6-EBE0-4B31-A9EA-92EFAB498879}" presName="compNode" presStyleCnt="0"/>
+      <dgm:spPr/>
+    </dgm:pt>
+    <dgm:pt modelId="{8E743E34-868E-41DD-A707-BB6EFFF62D82}" type="pres">
+      <dgm:prSet presAssocID="{A7BAE8F6-EBE0-4B31-A9EA-92EFAB498879}" presName="iconBgRect" presStyleLbl="bgShp" presStyleIdx="2" presStyleCnt="3" custLinFactNeighborX="-11113" custLinFactNeighborY="-1172"/>
+      <dgm:spPr>
+        <a:prstGeom prst="round2DiagRect">
+          <a:avLst>
+            <a:gd name="adj1" fmla="val 29727"/>
+            <a:gd name="adj2" fmla="val 0"/>
+          </a:avLst>
+        </a:prstGeom>
+      </dgm:spPr>
+    </dgm:pt>
+    <dgm:pt modelId="{D3ADFE0C-E6B1-4B5B-A281-2D1B9E00528A}" type="pres">
+      <dgm:prSet presAssocID="{A7BAE8F6-EBE0-4B31-A9EA-92EFAB498879}" presName="iconRect" presStyleLbl="node1" presStyleIdx="2" presStyleCnt="3" custLinFactNeighborX="-19369" custLinFactNeighborY="-2043"/>
+      <dgm:spPr>
+        <a:blipFill>
+          <a:blip xmlns:r="http://schemas.openxmlformats.org/officeDocument/2006/relationships" r:embed="rId6">
+            <a:extLst>
+              <a:ext uri="{96DAC541-7B7A-43D3-8B79-37D633B846F1}">
+                <asvg:svgBlip xmlns:asvg="http://schemas.microsoft.com/office/drawing/2016/SVG/main" r:embed="rId7"/>
+              </a:ext>
+            </a:extLst>
+          </a:blip>
+          <a:srcRect/>
+          <a:stretch>
+            <a:fillRect/>
+          </a:stretch>
+        </a:blipFill>
+      </dgm:spPr>
+      <dgm:extLst>
+        <a:ext uri="{E40237B7-FDA0-4F09-8148-C483321AD2D9}">
+          <dgm14:cNvPr xmlns:dgm14="http://schemas.microsoft.com/office/drawing/2010/diagram" id="0" name="" descr="Usb Stick"/>
+        </a:ext>
+      </dgm:extLst>
+    </dgm:pt>
+    <dgm:pt modelId="{DB093FFB-DAAD-4B30-8A73-CB82EFA088E7}" type="pres">
+      <dgm:prSet presAssocID="{A7BAE8F6-EBE0-4B31-A9EA-92EFAB498879}" presName="spaceRect" presStyleCnt="0"/>
+      <dgm:spPr/>
+    </dgm:pt>
+    <dgm:pt modelId="{5A6A5CF1-306F-461C-9631-815652B61E65}" type="pres">
+      <dgm:prSet presAssocID="{A7BAE8F6-EBE0-4B31-A9EA-92EFAB498879}" presName="textRect" presStyleLbl="revTx" presStyleIdx="2" presStyleCnt="3" custLinFactNeighborX="-3480" custLinFactNeighborY="-66532">
         <dgm:presLayoutVars>
           <dgm:chMax val="1"/>
           <dgm:chPref val="1"/>
@@ -2791,6 +2924,8 @@
     <dgm:cxn modelId="{8C27035A-8C1B-4BE8-A4AF-E3DA3DA71EAA}" type="presOf" srcId="{B7CA5452-D040-4A4E-AC57-621C93A53CA4}" destId="{C36941ED-5DA8-4069-BC84-144D8FCF12C8}" srcOrd="0" destOrd="0" presId="urn:microsoft.com/office/officeart/2018/5/layout/IconLeafLabelList"/>
     <dgm:cxn modelId="{C12396E7-83C6-4C39-BF77-94AF4B5FA94B}" type="presOf" srcId="{E2FE9E51-AC0F-4703-8A03-EA856293271A}" destId="{119DC426-ACF9-4541-AFFF-53F8056FEEA6}" srcOrd="0" destOrd="0" presId="urn:microsoft.com/office/officeart/2018/5/layout/IconLeafLabelList"/>
     <dgm:cxn modelId="{51915FEC-EB2C-41D3-9AEF-6085B28CBBD9}" srcId="{E2FE9E51-AC0F-4703-8A03-EA856293271A}" destId="{ECA1677E-FCCB-40AF-93D0-51A0607F8C01}" srcOrd="0" destOrd="0" parTransId="{71074A8E-3D4D-45EE-B00C-DE0738D9BD20}" sibTransId="{32D6A8B6-3563-4326-8BB5-943464E9A141}"/>
+    <dgm:cxn modelId="{DEC924F2-5DFC-4BB0-81C4-72F0734476B2}" srcId="{E2FE9E51-AC0F-4703-8A03-EA856293271A}" destId="{A7BAE8F6-EBE0-4B31-A9EA-92EFAB498879}" srcOrd="2" destOrd="0" parTransId="{13DF959B-7204-494D-98FB-A3BB5E926417}" sibTransId="{2E06DD33-D603-46C4-8AD0-33492B3FFEF2}"/>
+    <dgm:cxn modelId="{AA692BF2-D5DB-4B3A-8E09-8440CCBAF2FE}" type="presOf" srcId="{A7BAE8F6-EBE0-4B31-A9EA-92EFAB498879}" destId="{5A6A5CF1-306F-461C-9631-815652B61E65}" srcOrd="0" destOrd="0" presId="urn:microsoft.com/office/officeart/2018/5/layout/IconLeafLabelList"/>
     <dgm:cxn modelId="{194E0F46-A02B-4ED6-8B1A-0469DD4D82FF}" type="presParOf" srcId="{119DC426-ACF9-4541-AFFF-53F8056FEEA6}" destId="{0B529B3E-781C-4A42-A0A5-D0A1E62C0162}" srcOrd="0" destOrd="0" presId="urn:microsoft.com/office/officeart/2018/5/layout/IconLeafLabelList"/>
     <dgm:cxn modelId="{379AC5F5-2EFA-4593-83DD-C9A011AFA042}" type="presParOf" srcId="{0B529B3E-781C-4A42-A0A5-D0A1E62C0162}" destId="{CD11A416-E697-4B70-9753-88472124D763}" srcOrd="0" destOrd="0" presId="urn:microsoft.com/office/officeart/2018/5/layout/IconLeafLabelList"/>
     <dgm:cxn modelId="{F299A7BF-CAB4-485A-993E-E666A4DA78D1}" type="presParOf" srcId="{0B529B3E-781C-4A42-A0A5-D0A1E62C0162}" destId="{ED68D38F-83F1-4B3C-BE0B-5837012B99B3}" srcOrd="1" destOrd="0" presId="urn:microsoft.com/office/officeart/2018/5/layout/IconLeafLabelList"/>
@@ -2802,6 +2937,12 @@
     <dgm:cxn modelId="{54176B80-A8D8-42E1-970E-CDC43D4599DF}" type="presParOf" srcId="{EEAA1C1F-C6CC-4EEA-A3F2-AD155F498FB7}" destId="{1BB9DB62-BEA7-4130-965F-EFED00E22180}" srcOrd="1" destOrd="0" presId="urn:microsoft.com/office/officeart/2018/5/layout/IconLeafLabelList"/>
     <dgm:cxn modelId="{BFF2526E-982B-405A-92FB-EDDC4943A0FF}" type="presParOf" srcId="{EEAA1C1F-C6CC-4EEA-A3F2-AD155F498FB7}" destId="{E58CDF8F-C79A-4F93-952C-E0CCC36D9E93}" srcOrd="2" destOrd="0" presId="urn:microsoft.com/office/officeart/2018/5/layout/IconLeafLabelList"/>
     <dgm:cxn modelId="{90892994-6857-4EDE-8973-C2ADCCC0E72A}" type="presParOf" srcId="{EEAA1C1F-C6CC-4EEA-A3F2-AD155F498FB7}" destId="{C36941ED-5DA8-4069-BC84-144D8FCF12C8}" srcOrd="3" destOrd="0" presId="urn:microsoft.com/office/officeart/2018/5/layout/IconLeafLabelList"/>
+    <dgm:cxn modelId="{8DD20596-9B62-4AA9-A27F-0BAD30130DFE}" type="presParOf" srcId="{119DC426-ACF9-4541-AFFF-53F8056FEEA6}" destId="{9C6EE070-B44D-4E71-BB5A-CA966FFDA2E8}" srcOrd="3" destOrd="0" presId="urn:microsoft.com/office/officeart/2018/5/layout/IconLeafLabelList"/>
+    <dgm:cxn modelId="{297DC759-8E67-4CA7-B577-2BFAFFDD4219}" type="presParOf" srcId="{119DC426-ACF9-4541-AFFF-53F8056FEEA6}" destId="{D581F1A7-9ADC-4464-909F-2B980C10E7D1}" srcOrd="4" destOrd="0" presId="urn:microsoft.com/office/officeart/2018/5/layout/IconLeafLabelList"/>
+    <dgm:cxn modelId="{07A45D00-409D-4A19-81A0-38158CD62BC0}" type="presParOf" srcId="{D581F1A7-9ADC-4464-909F-2B980C10E7D1}" destId="{8E743E34-868E-41DD-A707-BB6EFFF62D82}" srcOrd="0" destOrd="0" presId="urn:microsoft.com/office/officeart/2018/5/layout/IconLeafLabelList"/>
+    <dgm:cxn modelId="{6769660C-EF42-4FC7-878E-BE635C1BAEE0}" type="presParOf" srcId="{D581F1A7-9ADC-4464-909F-2B980C10E7D1}" destId="{D3ADFE0C-E6B1-4B5B-A281-2D1B9E00528A}" srcOrd="1" destOrd="0" presId="urn:microsoft.com/office/officeart/2018/5/layout/IconLeafLabelList"/>
+    <dgm:cxn modelId="{42ED8232-8346-496A-B7E5-4C6539CD2D8A}" type="presParOf" srcId="{D581F1A7-9ADC-4464-909F-2B980C10E7D1}" destId="{DB093FFB-DAAD-4B30-8A73-CB82EFA088E7}" srcOrd="2" destOrd="0" presId="urn:microsoft.com/office/officeart/2018/5/layout/IconLeafLabelList"/>
+    <dgm:cxn modelId="{B7F2A0A5-9F5C-4687-B52B-B4E70F4755BF}" type="presParOf" srcId="{D581F1A7-9ADC-4464-909F-2B980C10E7D1}" destId="{5A6A5CF1-306F-461C-9631-815652B61E65}" srcOrd="3" destOrd="0" presId="urn:microsoft.com/office/officeart/2018/5/layout/IconLeafLabelList"/>
   </dgm:cxnLst>
   <dgm:bg/>
   <dgm:whole/>
@@ -3748,8 +3889,8 @@
       </dsp:nvSpPr>
       <dsp:spPr>
         <a:xfrm>
-          <a:off x="2044800" y="378761"/>
-          <a:ext cx="2196000" cy="2196000"/>
+          <a:off x="932914" y="518982"/>
+          <a:ext cx="1887187" cy="1887187"/>
         </a:xfrm>
         <a:prstGeom prst="round2DiagRect">
           <a:avLst>
@@ -3790,8 +3931,8 @@
       </dsp:nvSpPr>
       <dsp:spPr>
         <a:xfrm>
-          <a:off x="2512800" y="846761"/>
-          <a:ext cx="1260000" cy="1260000"/>
+          <a:off x="1335102" y="921166"/>
+          <a:ext cx="1082812" cy="1082812"/>
         </a:xfrm>
         <a:prstGeom prst="rect">
           <a:avLst/>
@@ -3840,8 +3981,8 @@
       </dsp:nvSpPr>
       <dsp:spPr>
         <a:xfrm>
-          <a:off x="1342800" y="3258762"/>
-          <a:ext cx="3600000" cy="720000"/>
+          <a:off x="308294" y="2788366"/>
+          <a:ext cx="3136443" cy="742500"/>
         </a:xfrm>
         <a:prstGeom prst="rect">
           <a:avLst/>
@@ -3870,9 +4011,9 @@
         </a:bodyPr>
         <a:lstStyle/>
         <a:p>
-          <a:pPr marL="0" lvl="0" indent="0" algn="ctr" defTabSz="977900">
+          <a:pPr marL="0" lvl="0" indent="0" algn="ctr" defTabSz="488950">
             <a:lnSpc>
-              <a:spcPct val="90000"/>
+              <a:spcPct val="100000"/>
             </a:lnSpc>
             <a:spcBef>
               <a:spcPct val="0"/>
@@ -3884,15 +4025,15 @@
             <a:defRPr cap="all"/>
           </a:pPr>
           <a:r>
-            <a:rPr lang="fr-FR" sz="2200" kern="1200"/>
+            <a:rPr lang="fr-FR" sz="1100" kern="1200" dirty="0"/>
             <a:t>Chrome web-browser</a:t>
           </a:r>
-          <a:endParaRPr lang="en-US" sz="2200" kern="1200"/>
+          <a:endParaRPr lang="en-US" sz="1100" kern="1200" dirty="0"/>
         </a:p>
       </dsp:txBody>
       <dsp:txXfrm>
-        <a:off x="1342800" y="3258762"/>
-        <a:ext cx="3600000" cy="720000"/>
+        <a:off x="308294" y="2788366"/>
+        <a:ext cx="3136443" cy="742500"/>
       </dsp:txXfrm>
     </dsp:sp>
     <dsp:sp modelId="{E483868C-BBE0-4B9A-A0E3-046B1A96E799}">
@@ -3902,8 +4043,8 @@
       </dsp:nvSpPr>
       <dsp:spPr>
         <a:xfrm>
-          <a:off x="6274800" y="378761"/>
-          <a:ext cx="2196000" cy="2196000"/>
+          <a:off x="4229342" y="547894"/>
+          <a:ext cx="1887187" cy="1887187"/>
         </a:xfrm>
         <a:prstGeom prst="round2DiagRect">
           <a:avLst>
@@ -3944,8 +4085,8 @@
       </dsp:nvSpPr>
       <dsp:spPr>
         <a:xfrm>
-          <a:off x="6742800" y="846761"/>
-          <a:ext cx="1260000" cy="1260000"/>
+          <a:off x="4631505" y="950088"/>
+          <a:ext cx="1082812" cy="1082812"/>
         </a:xfrm>
         <a:prstGeom prst="rect">
           <a:avLst/>
@@ -3994,8 +4135,8 @@
       </dsp:nvSpPr>
       <dsp:spPr>
         <a:xfrm>
-          <a:off x="5572800" y="3258762"/>
-          <a:ext cx="3600000" cy="720000"/>
+          <a:off x="3661053" y="2667992"/>
+          <a:ext cx="3093750" cy="742500"/>
         </a:xfrm>
         <a:prstGeom prst="rect">
           <a:avLst/>
@@ -4024,9 +4165,9 @@
         </a:bodyPr>
         <a:lstStyle/>
         <a:p>
-          <a:pPr marL="0" lvl="0" indent="0" algn="ctr" defTabSz="977900">
+          <a:pPr marL="0" lvl="0" indent="0" algn="ctr" defTabSz="488950">
             <a:lnSpc>
-              <a:spcPct val="90000"/>
+              <a:spcPct val="100000"/>
             </a:lnSpc>
             <a:spcBef>
               <a:spcPct val="0"/>
@@ -4038,31 +4179,234 @@
             <a:defRPr cap="all"/>
           </a:pPr>
           <a:r>
-            <a:rPr lang="fr-FR" sz="2200" kern="1200" dirty="0"/>
+            <a:rPr lang="fr-FR" sz="1100" kern="1200" dirty="0"/>
             <a:t>A </a:t>
           </a:r>
           <a:r>
-            <a:rPr lang="fr-FR" sz="2200" kern="1200" dirty="0" err="1"/>
+            <a:rPr lang="fr-FR" sz="1100" kern="1200" dirty="0" err="1"/>
             <a:t>text</a:t>
           </a:r>
           <a:r>
-            <a:rPr lang="fr-FR" sz="2200" kern="1200" dirty="0"/>
-            <a:t> editor (Visual Studio Code, Sublime </a:t>
+            <a:rPr lang="fr-FR" sz="1100" kern="1200" dirty="0"/>
+            <a:t> editor </a:t>
+          </a:r>
+        </a:p>
+        <a:p>
+          <a:pPr marL="0" lvl="0" indent="0" algn="ctr" defTabSz="488950">
+            <a:lnSpc>
+              <a:spcPct val="100000"/>
+            </a:lnSpc>
+            <a:spcBef>
+              <a:spcPct val="0"/>
+            </a:spcBef>
+            <a:spcAft>
+              <a:spcPct val="35000"/>
+            </a:spcAft>
+            <a:buNone/>
+            <a:defRPr cap="all"/>
+          </a:pPr>
+          <a:r>
+            <a:rPr lang="fr-FR" sz="1100" kern="1200" dirty="0"/>
+            <a:t>(VS Code, Sublime </a:t>
           </a:r>
           <a:r>
-            <a:rPr lang="fr-FR" sz="2200" kern="1200" dirty="0" err="1"/>
+            <a:rPr lang="fr-FR" sz="1100" kern="1200" dirty="0" err="1"/>
             <a:t>Text</a:t>
           </a:r>
           <a:r>
-            <a:rPr lang="fr-FR" sz="2200" kern="1200" dirty="0"/>
+            <a:rPr lang="fr-FR" sz="1100" kern="1200" dirty="0"/>
             <a:t>, …)</a:t>
           </a:r>
-          <a:endParaRPr lang="en-US" sz="2200" kern="1200" dirty="0"/>
+          <a:endParaRPr lang="en-US" sz="1100" kern="1200" dirty="0"/>
         </a:p>
       </dsp:txBody>
       <dsp:txXfrm>
-        <a:off x="5572800" y="3258762"/>
-        <a:ext cx="3600000" cy="720000"/>
+        <a:off x="3661053" y="2667992"/>
+        <a:ext cx="3093750" cy="742500"/>
+      </dsp:txXfrm>
+    </dsp:sp>
+    <dsp:sp modelId="{8E743E34-868E-41DD-A707-BB6EFFF62D82}">
+      <dsp:nvSpPr>
+        <dsp:cNvPr id="0" name=""/>
+        <dsp:cNvSpPr/>
+      </dsp:nvSpPr>
+      <dsp:spPr>
+        <a:xfrm>
+          <a:off x="7760986" y="547894"/>
+          <a:ext cx="1887187" cy="1887187"/>
+        </a:xfrm>
+        <a:prstGeom prst="round2DiagRect">
+          <a:avLst>
+            <a:gd name="adj1" fmla="val 29727"/>
+            <a:gd name="adj2" fmla="val 0"/>
+          </a:avLst>
+        </a:prstGeom>
+        <a:solidFill>
+          <a:schemeClr val="dk2">
+            <a:hueOff val="0"/>
+            <a:satOff val="0"/>
+            <a:lumOff val="0"/>
+            <a:alphaOff val="0"/>
+          </a:schemeClr>
+        </a:solidFill>
+        <a:ln>
+          <a:noFill/>
+        </a:ln>
+        <a:effectLst/>
+      </dsp:spPr>
+      <dsp:style>
+        <a:lnRef idx="0">
+          <a:scrgbClr r="0" g="0" b="0"/>
+        </a:lnRef>
+        <a:fillRef idx="1">
+          <a:scrgbClr r="0" g="0" b="0"/>
+        </a:fillRef>
+        <a:effectRef idx="0">
+          <a:scrgbClr r="0" g="0" b="0"/>
+        </a:effectRef>
+        <a:fontRef idx="minor"/>
+      </dsp:style>
+    </dsp:sp>
+    <dsp:sp modelId="{D3ADFE0C-E6B1-4B5B-A281-2D1B9E00528A}">
+      <dsp:nvSpPr>
+        <dsp:cNvPr id="0" name=""/>
+        <dsp:cNvSpPr/>
+      </dsp:nvSpPr>
+      <dsp:spPr>
+        <a:xfrm>
+          <a:off x="8163166" y="950077"/>
+          <a:ext cx="1082812" cy="1082812"/>
+        </a:xfrm>
+        <a:prstGeom prst="rect">
+          <a:avLst/>
+        </a:prstGeom>
+        <a:blipFill>
+          <a:blip xmlns:r="http://schemas.openxmlformats.org/officeDocument/2006/relationships" r:embed="rId5">
+            <a:extLst>
+              <a:ext uri="{96DAC541-7B7A-43D3-8B79-37D633B846F1}">
+                <asvg:svgBlip xmlns:asvg="http://schemas.microsoft.com/office/drawing/2016/SVG/main" r:embed="rId6"/>
+              </a:ext>
+            </a:extLst>
+          </a:blip>
+          <a:srcRect/>
+          <a:stretch>
+            <a:fillRect/>
+          </a:stretch>
+        </a:blipFill>
+        <a:ln w="12700" cap="flat" cmpd="sng" algn="ctr">
+          <a:solidFill>
+            <a:schemeClr val="lt2">
+              <a:alpha val="0"/>
+              <a:hueOff val="0"/>
+              <a:satOff val="0"/>
+              <a:lumOff val="0"/>
+              <a:alphaOff val="0"/>
+            </a:schemeClr>
+          </a:solidFill>
+          <a:prstDash val="solid"/>
+          <a:miter lim="800000"/>
+        </a:ln>
+        <a:effectLst/>
+      </dsp:spPr>
+      <dsp:style>
+        <a:lnRef idx="2">
+          <a:scrgbClr r="0" g="0" b="0"/>
+        </a:lnRef>
+        <a:fillRef idx="1">
+          <a:scrgbClr r="0" g="0" b="0"/>
+        </a:fillRef>
+        <a:effectRef idx="0">
+          <a:scrgbClr r="0" g="0" b="0"/>
+        </a:effectRef>
+        <a:fontRef idx="minor">
+          <a:schemeClr val="lt1"/>
+        </a:fontRef>
+      </dsp:style>
+    </dsp:sp>
+    <dsp:sp modelId="{5A6A5CF1-306F-461C-9631-815652B61E65}">
+      <dsp:nvSpPr>
+        <dsp:cNvPr id="0" name=""/>
+        <dsp:cNvSpPr/>
+      </dsp:nvSpPr>
+      <dsp:spPr>
+        <a:xfrm>
+          <a:off x="7259765" y="2551011"/>
+          <a:ext cx="3093750" cy="742500"/>
+        </a:xfrm>
+        <a:prstGeom prst="rect">
+          <a:avLst/>
+        </a:prstGeom>
+        <a:noFill/>
+        <a:ln>
+          <a:noFill/>
+        </a:ln>
+        <a:effectLst/>
+      </dsp:spPr>
+      <dsp:style>
+        <a:lnRef idx="0">
+          <a:scrgbClr r="0" g="0" b="0"/>
+        </a:lnRef>
+        <a:fillRef idx="0">
+          <a:scrgbClr r="0" g="0" b="0"/>
+        </a:fillRef>
+        <a:effectRef idx="0">
+          <a:scrgbClr r="0" g="0" b="0"/>
+        </a:effectRef>
+        <a:fontRef idx="minor"/>
+      </dsp:style>
+      <dsp:txBody>
+        <a:bodyPr spcFirstLastPara="0" vert="horz" wrap="square" lIns="0" tIns="0" rIns="0" bIns="0" numCol="1" spcCol="1270" anchor="t" anchorCtr="0">
+          <a:noAutofit/>
+        </a:bodyPr>
+        <a:lstStyle/>
+        <a:p>
+          <a:pPr marL="0" lvl="0" indent="0" algn="ctr" defTabSz="488950">
+            <a:lnSpc>
+              <a:spcPct val="100000"/>
+            </a:lnSpc>
+            <a:spcBef>
+              <a:spcPct val="0"/>
+            </a:spcBef>
+            <a:spcAft>
+              <a:spcPct val="35000"/>
+            </a:spcAft>
+            <a:buNone/>
+            <a:defRPr cap="all"/>
+          </a:pPr>
+          <a:r>
+            <a:rPr lang="en-US" sz="1100" kern="1200" dirty="0"/>
+            <a:t>A Bluetooth connector</a:t>
+          </a:r>
+          <a:endParaRPr lang="en-US" sz="1100" kern="1200" dirty="0">
+            <a:hlinkClick xmlns:r="http://schemas.openxmlformats.org/officeDocument/2006/relationships" r:id="rId7"/>
+          </a:endParaRPr>
+        </a:p>
+        <a:p>
+          <a:pPr marL="0" lvl="0" indent="0" algn="ctr" defTabSz="488950">
+            <a:lnSpc>
+              <a:spcPct val="100000"/>
+            </a:lnSpc>
+            <a:spcBef>
+              <a:spcPct val="0"/>
+            </a:spcBef>
+            <a:spcAft>
+              <a:spcPct val="35000"/>
+            </a:spcAft>
+            <a:buNone/>
+            <a:defRPr cap="all"/>
+          </a:pPr>
+          <a:r>
+            <a:rPr lang="en-US" sz="1100" kern="1200" dirty="0">
+              <a:hlinkClick xmlns:r="http://schemas.openxmlformats.org/officeDocument/2006/relationships" r:id="rId7"/>
+            </a:rPr>
+            <a:t>https://www.amazon.com/Plugable-Bluetooth-Adapter-Raspberry-Compatible/dp/B009ZIILLI</a:t>
+          </a:r>
+          <a:endParaRPr lang="en-US" sz="1100" kern="1200" dirty="0"/>
+        </a:p>
+      </dsp:txBody>
+      <dsp:txXfrm>
+        <a:off x="7259765" y="2551011"/>
+        <a:ext cx="3093750" cy="742500"/>
       </dsp:txXfrm>
     </dsp:sp>
   </dsp:spTree>
@@ -17379,7 +17723,7 @@
             <p:ph idx="1"/>
             <p:extLst>
               <p:ext uri="{D42A27DB-BD31-4B8C-83A1-F6EECF244321}">
-                <p14:modId xmlns:p14="http://schemas.microsoft.com/office/powerpoint/2010/main" val="225326065"/>
+                <p14:modId xmlns:p14="http://schemas.microsoft.com/office/powerpoint/2010/main" val="1349664507"/>
               </p:ext>
             </p:extLst>
           </p:nvPr>

</xml_diff>